<commit_message>
comments added to head gesture script
</commit_message>
<xml_diff>
--- a/Presentation/New Microsoft PowerPoint Presentation.pptx
+++ b/Presentation/New Microsoft PowerPoint Presentation.pptx
@@ -112,6 +112,11 @@
       </a:defRPr>
     </a:lvl9pPr>
   </p:defaultTextStyle>
+  <p:extLst>
+    <p:ext uri="{EFAFB233-063F-42B5-8137-9DF3F51BA10A}">
+      <p15:sldGuideLst xmlns:p15="http://schemas.microsoft.com/office/powerpoint/2012/main"/>
+    </p:ext>
+  </p:extLst>
 </p:presentation>
 </file>
 
@@ -246,7 +251,7 @@
           <a:p>
             <a:fld id="{54F6BBB5-41A2-428D-A1DC-B9962BD0CBCA}" type="datetimeFigureOut">
               <a:rPr lang="en-IE" smtClean="0"/>
-              <a:t>28/03/2019</a:t>
+              <a:t>01/04/2019</a:t>
             </a:fld>
             <a:endParaRPr lang="en-IE" dirty="0"/>
           </a:p>
@@ -416,7 +421,7 @@
           <a:p>
             <a:fld id="{54F6BBB5-41A2-428D-A1DC-B9962BD0CBCA}" type="datetimeFigureOut">
               <a:rPr lang="en-IE" smtClean="0"/>
-              <a:t>28/03/2019</a:t>
+              <a:t>01/04/2019</a:t>
             </a:fld>
             <a:endParaRPr lang="en-IE" dirty="0"/>
           </a:p>
@@ -596,7 +601,7 @@
           <a:p>
             <a:fld id="{54F6BBB5-41A2-428D-A1DC-B9962BD0CBCA}" type="datetimeFigureOut">
               <a:rPr lang="en-IE" smtClean="0"/>
-              <a:t>28/03/2019</a:t>
+              <a:t>01/04/2019</a:t>
             </a:fld>
             <a:endParaRPr lang="en-IE" dirty="0"/>
           </a:p>
@@ -766,7 +771,7 @@
           <a:p>
             <a:fld id="{54F6BBB5-41A2-428D-A1DC-B9962BD0CBCA}" type="datetimeFigureOut">
               <a:rPr lang="en-IE" smtClean="0"/>
-              <a:t>28/03/2019</a:t>
+              <a:t>01/04/2019</a:t>
             </a:fld>
             <a:endParaRPr lang="en-IE" dirty="0"/>
           </a:p>
@@ -1012,7 +1017,7 @@
           <a:p>
             <a:fld id="{54F6BBB5-41A2-428D-A1DC-B9962BD0CBCA}" type="datetimeFigureOut">
               <a:rPr lang="en-IE" smtClean="0"/>
-              <a:t>28/03/2019</a:t>
+              <a:t>01/04/2019</a:t>
             </a:fld>
             <a:endParaRPr lang="en-IE" dirty="0"/>
           </a:p>
@@ -1244,7 +1249,7 @@
           <a:p>
             <a:fld id="{54F6BBB5-41A2-428D-A1DC-B9962BD0CBCA}" type="datetimeFigureOut">
               <a:rPr lang="en-IE" smtClean="0"/>
-              <a:t>28/03/2019</a:t>
+              <a:t>01/04/2019</a:t>
             </a:fld>
             <a:endParaRPr lang="en-IE" dirty="0"/>
           </a:p>
@@ -1611,7 +1616,7 @@
           <a:p>
             <a:fld id="{54F6BBB5-41A2-428D-A1DC-B9962BD0CBCA}" type="datetimeFigureOut">
               <a:rPr lang="en-IE" smtClean="0"/>
-              <a:t>28/03/2019</a:t>
+              <a:t>01/04/2019</a:t>
             </a:fld>
             <a:endParaRPr lang="en-IE" dirty="0"/>
           </a:p>
@@ -1729,7 +1734,7 @@
           <a:p>
             <a:fld id="{54F6BBB5-41A2-428D-A1DC-B9962BD0CBCA}" type="datetimeFigureOut">
               <a:rPr lang="en-IE" smtClean="0"/>
-              <a:t>28/03/2019</a:t>
+              <a:t>01/04/2019</a:t>
             </a:fld>
             <a:endParaRPr lang="en-IE" dirty="0"/>
           </a:p>
@@ -1824,7 +1829,7 @@
           <a:p>
             <a:fld id="{54F6BBB5-41A2-428D-A1DC-B9962BD0CBCA}" type="datetimeFigureOut">
               <a:rPr lang="en-IE" smtClean="0"/>
-              <a:t>28/03/2019</a:t>
+              <a:t>01/04/2019</a:t>
             </a:fld>
             <a:endParaRPr lang="en-IE" dirty="0"/>
           </a:p>
@@ -2101,7 +2106,7 @@
           <a:p>
             <a:fld id="{54F6BBB5-41A2-428D-A1DC-B9962BD0CBCA}" type="datetimeFigureOut">
               <a:rPr lang="en-IE" smtClean="0"/>
-              <a:t>28/03/2019</a:t>
+              <a:t>01/04/2019</a:t>
             </a:fld>
             <a:endParaRPr lang="en-IE" dirty="0"/>
           </a:p>
@@ -2354,7 +2359,7 @@
           <a:p>
             <a:fld id="{54F6BBB5-41A2-428D-A1DC-B9962BD0CBCA}" type="datetimeFigureOut">
               <a:rPr lang="en-IE" smtClean="0"/>
-              <a:t>28/03/2019</a:t>
+              <a:t>01/04/2019</a:t>
             </a:fld>
             <a:endParaRPr lang="en-IE" dirty="0"/>
           </a:p>
@@ -2567,7 +2572,7 @@
           <a:p>
             <a:fld id="{54F6BBB5-41A2-428D-A1DC-B9962BD0CBCA}" type="datetimeFigureOut">
               <a:rPr lang="en-IE" smtClean="0"/>
-              <a:t>28/03/2019</a:t>
+              <a:t>01/04/2019</a:t>
             </a:fld>
             <a:endParaRPr lang="en-IE" dirty="0"/>
           </a:p>
@@ -3065,7 +3070,7 @@
           <a:p>
             <a:r>
               <a:rPr lang="en-IE" dirty="0" smtClean="0"/>
-              <a:t>Project Outline</a:t>
+              <a:t>Gesture Based Game Using Google VR</a:t>
             </a:r>
             <a:endParaRPr lang="en-IE" dirty="0"/>
           </a:p>
@@ -3127,7 +3132,7 @@
             </a:r>
             <a:r>
               <a:rPr lang="en-IE" dirty="0" smtClean="0"/>
-              <a:t>Game objects to avoid and collect</a:t>
+              <a:t>With Game objects to avoid and collect</a:t>
             </a:r>
           </a:p>
           <a:p>
@@ -3243,16 +3248,131 @@
         </p:nvSpPr>
         <p:spPr/>
         <p:txBody>
-          <a:bodyPr/>
-          <a:lstStyle/>
-          <a:p>
-            <a:pPr marL="457200" lvl="1" indent="0">
+          <a:bodyPr>
+            <a:normAutofit fontScale="77500" lnSpcReduction="20000"/>
+          </a:bodyPr>
+          <a:lstStyle/>
+          <a:p>
+            <a:pPr marL="0" indent="0">
               <a:buNone/>
             </a:pPr>
             <a:r>
               <a:rPr lang="en-IE" dirty="0" smtClean="0"/>
               <a:t>Idea for a black jack game.</a:t>
             </a:r>
+          </a:p>
+          <a:p>
+            <a:pPr lvl="1"/>
+            <a:r>
+              <a:rPr lang="en-IE" dirty="0" smtClean="0"/>
+              <a:t>Using head gestures to control the user input.</a:t>
+            </a:r>
+          </a:p>
+          <a:p>
+            <a:pPr lvl="1"/>
+            <a:r>
+              <a:rPr lang="en-IE" dirty="0" smtClean="0"/>
+              <a:t>Nodding Yes/No to stick or twist</a:t>
+            </a:r>
+          </a:p>
+          <a:p>
+            <a:pPr lvl="1"/>
+            <a:r>
+              <a:rPr lang="en-IE" dirty="0" smtClean="0"/>
+              <a:t>Justification for Yes and No Head gestures</a:t>
+            </a:r>
+          </a:p>
+          <a:p>
+            <a:pPr lvl="2"/>
+            <a:r>
+              <a:rPr lang="en-IE" dirty="0" smtClean="0"/>
+              <a:t>Universally Understood form of communication</a:t>
+            </a:r>
+          </a:p>
+          <a:p>
+            <a:pPr lvl="2"/>
+            <a:r>
+              <a:rPr lang="en-IE" dirty="0" smtClean="0"/>
+              <a:t>Short instruction set needed</a:t>
+            </a:r>
+          </a:p>
+          <a:p>
+            <a:pPr lvl="2"/>
+            <a:r>
+              <a:rPr lang="en-IE" dirty="0" smtClean="0"/>
+              <a:t>Quickly becomes obvious on how to use</a:t>
+            </a:r>
+          </a:p>
+          <a:p>
+            <a:pPr marL="0" indent="0">
+              <a:buNone/>
+            </a:pPr>
+            <a:r>
+              <a:rPr lang="en-IE" dirty="0" smtClean="0"/>
+              <a:t>Other options</a:t>
+            </a:r>
+          </a:p>
+          <a:p>
+            <a:pPr lvl="2"/>
+            <a:r>
+              <a:rPr lang="en-IE" dirty="0" smtClean="0"/>
+              <a:t>Tilt head Left/Right</a:t>
+            </a:r>
+          </a:p>
+          <a:p>
+            <a:pPr lvl="2"/>
+            <a:r>
+              <a:rPr lang="en-IE" dirty="0" smtClean="0"/>
+              <a:t>Look Left/Right</a:t>
+            </a:r>
+          </a:p>
+          <a:p>
+            <a:pPr lvl="2"/>
+            <a:r>
+              <a:rPr lang="en-IE" dirty="0" smtClean="0"/>
+              <a:t>Look Up/Down</a:t>
+            </a:r>
+          </a:p>
+          <a:p>
+            <a:pPr lvl="2"/>
+            <a:r>
+              <a:rPr lang="en-IE" dirty="0" smtClean="0"/>
+              <a:t>Use Gaze Input (Not working with latest Unity)</a:t>
+            </a:r>
+          </a:p>
+          <a:p>
+            <a:pPr marL="0" indent="0">
+              <a:buNone/>
+            </a:pPr>
+            <a:r>
+              <a:rPr lang="en-IE" dirty="0"/>
+              <a:t>Reason for choosing Black Jack</a:t>
+            </a:r>
+          </a:p>
+          <a:p>
+            <a:pPr lvl="1"/>
+            <a:r>
+              <a:rPr lang="en-IE" dirty="0"/>
+              <a:t>The rules of stick or twist map perfectly to yes no head gestures</a:t>
+            </a:r>
+          </a:p>
+          <a:p>
+            <a:pPr lvl="1"/>
+            <a:r>
+              <a:rPr lang="en-IE" dirty="0"/>
+              <a:t>Had considered a Higher or lower card game </a:t>
+            </a:r>
+          </a:p>
+          <a:p>
+            <a:pPr lvl="1"/>
+            <a:r>
+              <a:rPr lang="en-IE" dirty="0"/>
+              <a:t>Black Jack is more widely known </a:t>
+            </a:r>
+          </a:p>
+          <a:p>
+            <a:pPr lvl="2"/>
+            <a:endParaRPr lang="en-IE" dirty="0" smtClean="0"/>
           </a:p>
           <a:p>
             <a:pPr marL="457200" lvl="1" indent="0">
@@ -3264,39 +3384,6 @@
             <a:pPr marL="457200" lvl="1" indent="0">
               <a:buNone/>
             </a:pPr>
-            <a:r>
-              <a:rPr lang="en-IE" dirty="0" smtClean="0"/>
-              <a:t>Using head gestures to control the user input.</a:t>
-            </a:r>
-          </a:p>
-          <a:p>
-            <a:pPr marL="457200" lvl="1" indent="0">
-              <a:buNone/>
-            </a:pPr>
-            <a:endParaRPr lang="en-IE" dirty="0"/>
-          </a:p>
-          <a:p>
-            <a:pPr marL="457200" lvl="1" indent="0">
-              <a:buNone/>
-            </a:pPr>
-            <a:r>
-              <a:rPr lang="en-IE" dirty="0" smtClean="0"/>
-              <a:t>Nodding Yes to twist </a:t>
-            </a:r>
-          </a:p>
-          <a:p>
-            <a:pPr marL="457200" lvl="1" indent="0">
-              <a:buNone/>
-            </a:pPr>
-            <a:r>
-              <a:rPr lang="en-IE" dirty="0" smtClean="0"/>
-              <a:t>Nodding No to stick</a:t>
-            </a:r>
-          </a:p>
-          <a:p>
-            <a:pPr marL="457200" lvl="1" indent="0">
-              <a:buNone/>
-            </a:pPr>
             <a:endParaRPr lang="en-IE" dirty="0"/>
           </a:p>
           <a:p>
@@ -3313,6 +3400,66 @@
           </a:p>
         </p:txBody>
       </p:sp>
+      <p:pic>
+        <p:nvPicPr>
+          <p:cNvPr id="4" name="Picture 3"/>
+          <p:cNvPicPr>
+            <a:picLocks noChangeAspect="1"/>
+          </p:cNvPicPr>
+          <p:nvPr/>
+        </p:nvPicPr>
+        <p:blipFill>
+          <a:blip r:embed="rId2">
+            <a:extLst>
+              <a:ext uri="{28A0092B-C50C-407E-A947-70E740481C1C}">
+                <a14:useLocalDpi xmlns:a14="http://schemas.microsoft.com/office/drawing/2010/main" val="0"/>
+              </a:ext>
+            </a:extLst>
+          </a:blip>
+          <a:stretch>
+            <a:fillRect/>
+          </a:stretch>
+        </p:blipFill>
+        <p:spPr>
+          <a:xfrm>
+            <a:off x="7443054" y="2780934"/>
+            <a:ext cx="2466975" cy="1857375"/>
+          </a:xfrm>
+          <a:prstGeom prst="rect">
+            <a:avLst/>
+          </a:prstGeom>
+        </p:spPr>
+      </p:pic>
+      <p:pic>
+        <p:nvPicPr>
+          <p:cNvPr id="5" name="Picture 4"/>
+          <p:cNvPicPr>
+            <a:picLocks noChangeAspect="1"/>
+          </p:cNvPicPr>
+          <p:nvPr/>
+        </p:nvPicPr>
+        <p:blipFill>
+          <a:blip r:embed="rId3">
+            <a:extLst>
+              <a:ext uri="{28A0092B-C50C-407E-A947-70E740481C1C}">
+                <a14:useLocalDpi xmlns:a14="http://schemas.microsoft.com/office/drawing/2010/main" val="0"/>
+              </a:ext>
+            </a:extLst>
+          </a:blip>
+          <a:stretch>
+            <a:fillRect/>
+          </a:stretch>
+        </p:blipFill>
+        <p:spPr>
+          <a:xfrm>
+            <a:off x="7247792" y="890588"/>
+            <a:ext cx="2857500" cy="1600200"/>
+          </a:xfrm>
+          <a:prstGeom prst="rect">
+            <a:avLst/>
+          </a:prstGeom>
+        </p:spPr>
+      </p:pic>
     </p:spTree>
     <p:extLst>
       <p:ext uri="{BB962C8B-B14F-4D97-AF65-F5344CB8AC3E}">
@@ -3360,7 +3507,7 @@
           <a:p>
             <a:r>
               <a:rPr lang="en-IE" dirty="0" smtClean="0"/>
-              <a:t>Black Jack Implementation </a:t>
+              <a:t>Black Jack</a:t>
             </a:r>
             <a:endParaRPr lang="en-IE" dirty="0"/>
           </a:p>
@@ -3378,57 +3525,162 @@
         </p:nvSpPr>
         <p:spPr/>
         <p:txBody>
-          <a:bodyPr/>
-          <a:lstStyle/>
-          <a:p>
-            <a:r>
-              <a:rPr lang="en-IE" dirty="0" smtClean="0"/>
-              <a:t>Followed Tutorials on </a:t>
-            </a:r>
-            <a:r>
-              <a:rPr lang="en-IE" dirty="0" err="1"/>
-              <a:t>Y</a:t>
-            </a:r>
-            <a:r>
-              <a:rPr lang="en-IE" dirty="0" err="1" smtClean="0"/>
-              <a:t>outube</a:t>
-            </a:r>
-            <a:r>
-              <a:rPr lang="en-IE" dirty="0" smtClean="0"/>
-              <a:t> to implement the Game.</a:t>
-            </a:r>
-          </a:p>
-          <a:p>
-            <a:r>
-              <a:rPr lang="en-IE" dirty="0" smtClean="0"/>
-              <a:t>Talk about developing the Game.</a:t>
-            </a:r>
-          </a:p>
-          <a:p>
-            <a:r>
-              <a:rPr lang="en-IE" dirty="0" smtClean="0"/>
-              <a:t>Fishers shuffle etc.</a:t>
-            </a:r>
-          </a:p>
-          <a:p>
-            <a:r>
-              <a:rPr lang="en-IE" dirty="0" smtClean="0"/>
-              <a:t>Changed the design to fit a VR environment</a:t>
-            </a:r>
-          </a:p>
-          <a:p>
-            <a:pPr lvl="1"/>
-            <a:r>
-              <a:rPr lang="en-IE" dirty="0" smtClean="0"/>
-              <a:t>Buttons removed </a:t>
-            </a:r>
-          </a:p>
-          <a:p>
-            <a:pPr lvl="1"/>
-            <a:r>
-              <a:rPr lang="en-IE" dirty="0" smtClean="0"/>
-              <a:t>Hide play again button until game over.</a:t>
-            </a:r>
+          <a:bodyPr>
+            <a:normAutofit fontScale="55000" lnSpcReduction="20000"/>
+          </a:bodyPr>
+          <a:lstStyle/>
+          <a:p>
+            <a:pPr marL="0" indent="0">
+              <a:buNone/>
+            </a:pPr>
+            <a:r>
+              <a:rPr lang="en-IE" dirty="0" smtClean="0"/>
+              <a:t>Game Development.</a:t>
+            </a:r>
+          </a:p>
+          <a:p>
+            <a:r>
+              <a:rPr lang="en-IE" dirty="0" smtClean="0"/>
+              <a:t>YouTube Series</a:t>
+            </a:r>
+          </a:p>
+          <a:p>
+            <a:r>
+              <a:rPr lang="en-IE" dirty="0" smtClean="0"/>
+              <a:t>Fishers shuffle for deck of cards</a:t>
+            </a:r>
+          </a:p>
+          <a:p>
+            <a:pPr lvl="1"/>
+            <a:r>
+              <a:rPr lang="en-IE" dirty="0" smtClean="0"/>
+              <a:t>Random number between 0 – 51</a:t>
+            </a:r>
+          </a:p>
+          <a:p>
+            <a:pPr lvl="1"/>
+            <a:r>
+              <a:rPr lang="en-IE" dirty="0" smtClean="0"/>
+              <a:t>Number selected place on stack</a:t>
+            </a:r>
+          </a:p>
+          <a:p>
+            <a:pPr lvl="1"/>
+            <a:r>
+              <a:rPr lang="en-IE" dirty="0" smtClean="0"/>
+              <a:t>Remove selected number from </a:t>
+            </a:r>
+          </a:p>
+          <a:p>
+            <a:pPr lvl="1"/>
+            <a:r>
+              <a:rPr lang="en-IE" dirty="0"/>
+              <a:t>Random number between 0 – </a:t>
+            </a:r>
+            <a:r>
+              <a:rPr lang="en-IE" dirty="0" smtClean="0"/>
+              <a:t>50</a:t>
+            </a:r>
+          </a:p>
+          <a:p>
+            <a:pPr lvl="1"/>
+            <a:r>
+              <a:rPr lang="en-IE" dirty="0" smtClean="0"/>
+              <a:t>Repeat until list is empty</a:t>
+            </a:r>
+          </a:p>
+          <a:p>
+            <a:r>
+              <a:rPr lang="en-IE" dirty="0" smtClean="0"/>
+              <a:t>A pdf of card deck used and split in sprite editor.</a:t>
+            </a:r>
+          </a:p>
+          <a:p>
+            <a:r>
+              <a:rPr lang="en-IE" dirty="0" smtClean="0"/>
+              <a:t>Values added to cards based on mod 13 of sprites ordering</a:t>
+            </a:r>
+          </a:p>
+          <a:p>
+            <a:r>
+              <a:rPr lang="en-IE" dirty="0" smtClean="0"/>
+              <a:t>Three elements (Each one an array)</a:t>
+            </a:r>
+          </a:p>
+          <a:p>
+            <a:pPr lvl="1"/>
+            <a:r>
+              <a:rPr lang="en-IE" dirty="0" smtClean="0"/>
+              <a:t>Player (on turn push from the deck array)</a:t>
+            </a:r>
+          </a:p>
+          <a:p>
+            <a:pPr lvl="1"/>
+            <a:r>
+              <a:rPr lang="en-IE" dirty="0" smtClean="0"/>
+              <a:t>The deck (pop from the deck array at every turn and start game)</a:t>
+            </a:r>
+          </a:p>
+          <a:p>
+            <a:pPr lvl="1"/>
+            <a:r>
+              <a:rPr lang="en-IE" dirty="0" smtClean="0"/>
+              <a:t>The dealer </a:t>
+            </a:r>
+            <a:r>
+              <a:rPr lang="en-IE" dirty="0"/>
+              <a:t>(on turn </a:t>
+            </a:r>
+            <a:r>
+              <a:rPr lang="en-IE" dirty="0" smtClean="0"/>
+              <a:t>push </a:t>
+            </a:r>
+            <a:r>
+              <a:rPr lang="en-IE" dirty="0"/>
+              <a:t>from the deck </a:t>
+            </a:r>
+            <a:r>
+              <a:rPr lang="en-IE" dirty="0" smtClean="0"/>
+              <a:t>array</a:t>
+            </a:r>
+            <a:r>
+              <a:rPr lang="en-IE" dirty="0"/>
+              <a:t>)</a:t>
+            </a:r>
+            <a:endParaRPr lang="en-IE" dirty="0" smtClean="0"/>
+          </a:p>
+          <a:p>
+            <a:r>
+              <a:rPr lang="en-IE" dirty="0" smtClean="0"/>
+              <a:t>Buttons in UI for testing (Event Handlers to map to functions)</a:t>
+            </a:r>
+          </a:p>
+          <a:p>
+            <a:pPr lvl="1"/>
+            <a:r>
+              <a:rPr lang="en-IE" dirty="0" smtClean="0"/>
+              <a:t>Twist </a:t>
+            </a:r>
+          </a:p>
+          <a:p>
+            <a:pPr lvl="1"/>
+            <a:r>
+              <a:rPr lang="en-IE" dirty="0" smtClean="0"/>
+              <a:t>Stick</a:t>
+            </a:r>
+          </a:p>
+          <a:p>
+            <a:pPr lvl="1"/>
+            <a:r>
+              <a:rPr lang="en-IE" dirty="0" smtClean="0"/>
+              <a:t>Play again</a:t>
+            </a:r>
+          </a:p>
+          <a:p>
+            <a:pPr marL="457200" lvl="1" indent="0">
+              <a:buNone/>
+            </a:pPr>
+            <a:endParaRPr lang="en-IE" dirty="0" smtClean="0"/>
           </a:p>
           <a:p>
             <a:pPr marL="0" indent="0">
@@ -3503,12 +3755,21 @@
         </p:nvSpPr>
         <p:spPr/>
         <p:txBody>
-          <a:bodyPr/>
-          <a:lstStyle/>
-          <a:p>
-            <a:r>
-              <a:rPr lang="en-IE" dirty="0" smtClean="0"/>
-              <a:t>Unity package </a:t>
+          <a:bodyPr>
+            <a:normAutofit/>
+          </a:bodyPr>
+          <a:lstStyle/>
+          <a:p>
+            <a:r>
+              <a:rPr lang="en-IE" dirty="0" smtClean="0"/>
+              <a:t>Unity development package </a:t>
+            </a:r>
+          </a:p>
+          <a:p>
+            <a:pPr lvl="1"/>
+            <a:r>
+              <a:rPr lang="en-IE" dirty="0" smtClean="0"/>
+              <a:t>Link here …</a:t>
             </a:r>
           </a:p>
           <a:p>
@@ -3518,22 +3779,14 @@
             </a:r>
           </a:p>
           <a:p>
-            <a:r>
-              <a:rPr lang="en-IE" dirty="0" smtClean="0"/>
-              <a:t>Euler angles </a:t>
-            </a:r>
-          </a:p>
-          <a:p>
-            <a:r>
-              <a:rPr lang="en-IE" dirty="0" smtClean="0"/>
-              <a:t>Timeout for frame rate</a:t>
-            </a:r>
-          </a:p>
-          <a:p>
-            <a:r>
-              <a:rPr lang="en-IE" dirty="0" smtClean="0"/>
-              <a:t>Getting Yes and No recognised.</a:t>
-            </a:r>
+            <a:pPr lvl="1"/>
+            <a:r>
+              <a:rPr lang="en-IE" dirty="0" smtClean="0">
+                <a:hlinkClick r:id="rId2"/>
+              </a:rPr>
+              <a:t>Git hub link to Head Gesture page . </a:t>
+            </a:r>
+            <a:endParaRPr lang="en-IE" dirty="0" smtClean="0"/>
           </a:p>
           <a:p>
             <a:r>
@@ -3542,10 +3795,14 @@
             </a:r>
           </a:p>
           <a:p>
-            <a:r>
-              <a:rPr lang="en-IE" dirty="0" smtClean="0"/>
-              <a:t>Positioning of objects</a:t>
-            </a:r>
+            <a:pPr lvl="1"/>
+            <a:r>
+              <a:rPr lang="en-IE" dirty="0" smtClean="0">
+                <a:hlinkClick r:id="rId3"/>
+              </a:rPr>
+              <a:t>Triggering functions</a:t>
+            </a:r>
+            <a:endParaRPr lang="en-IE" dirty="0" smtClean="0"/>
           </a:p>
         </p:txBody>
       </p:sp>
@@ -3623,30 +3880,50 @@
             </a:r>
           </a:p>
           <a:p>
-            <a:r>
-              <a:rPr lang="en-IE" dirty="0" smtClean="0"/>
-              <a:t>Needed to build it to my phone every time I need to test</a:t>
-            </a:r>
-          </a:p>
-          <a:p>
-            <a:r>
-              <a:rPr lang="en-IE" dirty="0" smtClean="0"/>
-              <a:t>Frame rate problems</a:t>
-            </a:r>
-          </a:p>
-          <a:p>
-            <a:r>
-              <a:rPr lang="en-IE" dirty="0" smtClean="0"/>
-              <a:t>Amount of head movement needed to recognise</a:t>
-            </a:r>
-          </a:p>
-          <a:p>
-            <a:r>
-              <a:rPr lang="en-IE" dirty="0" smtClean="0"/>
-              <a:t>Fixes</a:t>
-            </a:r>
-          </a:p>
-          <a:p>
+            <a:pPr lvl="1"/>
+            <a:r>
+              <a:rPr lang="en-IE" dirty="0" smtClean="0"/>
+              <a:t>Game view is not stereoscopic as it used to be</a:t>
+            </a:r>
+          </a:p>
+          <a:p>
+            <a:pPr lvl="1"/>
+            <a:r>
+              <a:rPr lang="en-IE" dirty="0" smtClean="0"/>
+              <a:t>Need phone build every time to debug</a:t>
+            </a:r>
+          </a:p>
+          <a:p>
+            <a:r>
+              <a:rPr lang="en-IE" dirty="0" smtClean="0"/>
+              <a:t>Frame rate problems (Varying degrees of nod)</a:t>
+            </a:r>
+          </a:p>
+          <a:p>
+            <a:pPr lvl="1"/>
+            <a:r>
+              <a:rPr lang="en-IE" dirty="0" smtClean="0"/>
+              <a:t>Amount of head movement needed to recognise gesture</a:t>
+            </a:r>
+          </a:p>
+          <a:p>
+            <a:pPr lvl="1"/>
+            <a:r>
+              <a:rPr lang="en-IE" dirty="0" smtClean="0"/>
+              <a:t>Resetting the gesture to zero</a:t>
+            </a:r>
+          </a:p>
+          <a:p>
+            <a:pPr lvl="1"/>
+            <a:r>
+              <a:rPr lang="en-IE" dirty="0" smtClean="0"/>
+              <a:t>Small bugs just configuration issues</a:t>
+            </a:r>
+          </a:p>
+          <a:p>
+            <a:pPr marL="0" indent="0">
+              <a:buNone/>
+            </a:pPr>
             <a:endParaRPr lang="en-IE" dirty="0"/>
           </a:p>
         </p:txBody>
@@ -3719,12 +3996,52 @@
           <a:bodyPr/>
           <a:lstStyle/>
           <a:p>
+            <a:pPr marL="0" indent="0">
+              <a:buNone/>
+            </a:pPr>
             <a:r>
               <a:rPr lang="en-IE" dirty="0" smtClean="0"/>
               <a:t>Steps needed</a:t>
             </a:r>
           </a:p>
           <a:p>
+            <a:pPr lvl="1"/>
+            <a:r>
+              <a:rPr lang="en-IE" dirty="0" smtClean="0"/>
+              <a:t>Build </a:t>
+            </a:r>
+            <a:r>
+              <a:rPr lang="en-IE" dirty="0" err="1" smtClean="0"/>
+              <a:t>apk</a:t>
+            </a:r>
+            <a:r>
+              <a:rPr lang="en-IE" dirty="0" smtClean="0"/>
+              <a:t> for testing</a:t>
+            </a:r>
+          </a:p>
+          <a:p>
+            <a:pPr lvl="1"/>
+            <a:r>
+              <a:rPr lang="en-IE" dirty="0" smtClean="0"/>
+              <a:t>Follow best practice check list </a:t>
+            </a:r>
+          </a:p>
+          <a:p>
+            <a:pPr lvl="1"/>
+            <a:r>
+              <a:rPr lang="en-IE" dirty="0" smtClean="0"/>
+              <a:t>Deploy for testing </a:t>
+            </a:r>
+          </a:p>
+          <a:p>
+            <a:pPr lvl="1"/>
+            <a:r>
+              <a:rPr lang="en-IE" dirty="0" smtClean="0"/>
+              <a:t>Wait for results……………………….</a:t>
+            </a:r>
+          </a:p>
+          <a:p>
+            <a:pPr lvl="1"/>
             <a:r>
               <a:rPr lang="en-IE" dirty="0" smtClean="0"/>
               <a:t>Is it live now?</a:t>
@@ -3801,23 +4118,16 @@
           <a:bodyPr/>
           <a:lstStyle/>
           <a:p>
-            <a:r>
-              <a:rPr lang="en-IE" dirty="0" smtClean="0"/>
-              <a:t>Stream it to your laptop</a:t>
-            </a:r>
-          </a:p>
-          <a:p>
-            <a:r>
-              <a:rPr lang="en-IE" dirty="0" smtClean="0"/>
-              <a:t>Or show it to some people to play with.</a:t>
-            </a:r>
-          </a:p>
-          <a:p>
-            <a:r>
-              <a:rPr lang="en-IE" smtClean="0"/>
-              <a:t>Show Video</a:t>
-            </a:r>
-            <a:endParaRPr lang="en-IE" dirty="0"/>
+            <a:pPr marL="0" indent="0">
+              <a:buNone/>
+            </a:pPr>
+            <a:r>
+              <a:rPr lang="en-IE" dirty="0" smtClean="0">
+                <a:hlinkClick r:id="rId2"/>
+              </a:rPr>
+              <a:t>YouTube Demo</a:t>
+            </a:r>
+            <a:endParaRPr lang="en-IE" dirty="0" smtClean="0"/>
           </a:p>
         </p:txBody>
       </p:sp>
@@ -3868,7 +4178,7 @@
           <a:p>
             <a:r>
               <a:rPr lang="en-IE" dirty="0" smtClean="0"/>
-              <a:t>Conclusion/ Reflections</a:t>
+              <a:t>Conclusion</a:t>
             </a:r>
             <a:endParaRPr lang="en-IE" dirty="0"/>
           </a:p>
@@ -3886,15 +4196,23 @@
         </p:nvSpPr>
         <p:spPr/>
         <p:txBody>
-          <a:bodyPr/>
-          <a:lstStyle/>
-          <a:p>
+          <a:bodyPr>
+            <a:normAutofit fontScale="92500" lnSpcReduction="20000"/>
+          </a:bodyPr>
+          <a:lstStyle/>
+          <a:p>
+            <a:pPr marL="0" indent="0">
+              <a:buNone/>
+            </a:pPr>
             <a:r>
               <a:rPr lang="en-IE" dirty="0" smtClean="0"/>
               <a:t>What do I still need to do to complete the project?</a:t>
             </a:r>
           </a:p>
           <a:p>
+            <a:pPr marL="0" indent="0">
+              <a:buNone/>
+            </a:pPr>
             <a:r>
               <a:rPr lang="en-IE" dirty="0" smtClean="0"/>
               <a:t>Bugs</a:t>
@@ -3903,61 +4221,116 @@
           <a:p>
             <a:pPr lvl="1"/>
             <a:r>
+              <a:rPr lang="en-IE" dirty="0" smtClean="0"/>
+              <a:t>Centre position of game objects in phone view </a:t>
+            </a:r>
+          </a:p>
+          <a:p>
+            <a:pPr lvl="1"/>
+            <a:r>
+              <a:rPr lang="en-IE" dirty="0" smtClean="0"/>
+              <a:t>Reset Head position</a:t>
+            </a:r>
+          </a:p>
+          <a:p>
+            <a:pPr marL="0" indent="0">
+              <a:buNone/>
+            </a:pPr>
+            <a:r>
+              <a:rPr lang="en-IE" dirty="0" smtClean="0"/>
+              <a:t>Pros</a:t>
+            </a:r>
+          </a:p>
+          <a:p>
+            <a:pPr lvl="1"/>
+            <a:r>
+              <a:rPr lang="en-IE" dirty="0" smtClean="0"/>
+              <a:t>The process of VR app creation with Google VR.</a:t>
+            </a:r>
+          </a:p>
+          <a:p>
+            <a:pPr lvl="1"/>
+            <a:r>
+              <a:rPr lang="en-IE" dirty="0" smtClean="0"/>
+              <a:t>Lots of resources</a:t>
+            </a:r>
+          </a:p>
+          <a:p>
+            <a:pPr lvl="1"/>
+            <a:r>
+              <a:rPr lang="en-IE" dirty="0" smtClean="0"/>
+              <a:t>Many people had the same problems I had (with easy fixes)Cons</a:t>
+            </a:r>
+          </a:p>
+          <a:p>
+            <a:pPr marL="0" indent="0">
+              <a:buNone/>
+            </a:pPr>
+            <a:r>
+              <a:rPr lang="en-IE" dirty="0"/>
+              <a:t>Cons</a:t>
+            </a:r>
+          </a:p>
+          <a:p>
+            <a:pPr lvl="1"/>
+            <a:r>
+              <a:rPr lang="en-IE" dirty="0" smtClean="0"/>
+              <a:t>Lots of setup with Android </a:t>
+            </a:r>
+            <a:r>
               <a:rPr lang="en-IE" dirty="0" err="1" smtClean="0"/>
-              <a:t>Centreing</a:t>
-            </a:r>
-            <a:r>
-              <a:rPr lang="en-IE" dirty="0" smtClean="0"/>
-              <a:t> </a:t>
-            </a:r>
-          </a:p>
-          <a:p>
-            <a:pPr lvl="1"/>
-            <a:r>
-              <a:rPr lang="en-IE" dirty="0" smtClean="0"/>
-              <a:t>Reset Head position</a:t>
-            </a:r>
-          </a:p>
-          <a:p>
-            <a:pPr lvl="1"/>
-            <a:r>
-              <a:rPr lang="en-IE" dirty="0" smtClean="0"/>
-              <a:t>Play again button (Hide or inactive until game over)</a:t>
-            </a:r>
-          </a:p>
-          <a:p>
-            <a:r>
-              <a:rPr lang="en-IE" dirty="0" smtClean="0"/>
-              <a:t>What did I like?</a:t>
-            </a:r>
-          </a:p>
-          <a:p>
-            <a:pPr lvl="1"/>
-            <a:r>
-              <a:rPr lang="en-IE" dirty="0" smtClean="0"/>
-              <a:t>The process of VR app creation with Google VR.</a:t>
-            </a:r>
-          </a:p>
-          <a:p>
-            <a:pPr lvl="1"/>
-            <a:r>
-              <a:rPr lang="en-IE" dirty="0" smtClean="0"/>
-              <a:t>Lots of resources</a:t>
-            </a:r>
-          </a:p>
-          <a:p>
-            <a:pPr lvl="1"/>
-            <a:r>
-              <a:rPr lang="en-IE" dirty="0" smtClean="0"/>
-              <a:t>Many people had the same problems I had (with easy fixes).</a:t>
-            </a:r>
-          </a:p>
-          <a:p>
-            <a:pPr lvl="1"/>
-            <a:endParaRPr lang="en-IE" dirty="0" smtClean="0"/>
-          </a:p>
-          <a:p>
-            <a:pPr lvl="1"/>
+              <a:t>apk</a:t>
+            </a:r>
+            <a:r>
+              <a:rPr lang="en-IE" dirty="0" smtClean="0"/>
+              <a:t> and Google VR with unity </a:t>
+            </a:r>
+          </a:p>
+          <a:p>
+            <a:pPr lvl="1"/>
+            <a:r>
+              <a:rPr lang="en-IE" dirty="0" smtClean="0"/>
+              <a:t>Latest </a:t>
+            </a:r>
+            <a:r>
+              <a:rPr lang="en-IE" dirty="0"/>
+              <a:t>update has little to no backwards compatibility</a:t>
+            </a:r>
+          </a:p>
+          <a:p>
+            <a:pPr lvl="1"/>
+            <a:r>
+              <a:rPr lang="en-IE" dirty="0" smtClean="0"/>
+              <a:t>Limited </a:t>
+            </a:r>
+            <a:r>
+              <a:rPr lang="en-IE" dirty="0"/>
+              <a:t>in app unity view </a:t>
+            </a:r>
+          </a:p>
+          <a:p>
+            <a:pPr lvl="1"/>
+            <a:r>
+              <a:rPr lang="en-IE" dirty="0" smtClean="0"/>
+              <a:t>Unity </a:t>
+            </a:r>
+            <a:r>
+              <a:rPr lang="en-IE" dirty="0"/>
+              <a:t>view is not the same </a:t>
+            </a:r>
+            <a:r>
+              <a:rPr lang="en-IE" dirty="0" smtClean="0"/>
+              <a:t>as </a:t>
+            </a:r>
+            <a:r>
+              <a:rPr lang="en-IE" dirty="0"/>
+              <a:t>phone build view</a:t>
+            </a:r>
+          </a:p>
+          <a:p>
+            <a:pPr marL="457200" lvl="1" indent="0">
+              <a:buNone/>
+            </a:pPr>
             <a:endParaRPr lang="en-IE" dirty="0" smtClean="0"/>
           </a:p>
           <a:p>

</xml_diff>

<commit_message>
more comments added to CardStack.cs
</commit_message>
<xml_diff>
--- a/Presentation/New Microsoft PowerPoint Presentation.pptx
+++ b/Presentation/New Microsoft PowerPoint Presentation.pptx
@@ -3088,12 +3088,81 @@
         </p:nvSpPr>
         <p:spPr/>
         <p:txBody>
-          <a:bodyPr/>
+          <a:bodyPr>
+            <a:normAutofit/>
+          </a:bodyPr>
           <a:lstStyle/>
           <a:p>
             <a:r>
               <a:rPr lang="en-IE" dirty="0" smtClean="0"/>
               <a:t>Original Idea</a:t>
+            </a:r>
+          </a:p>
+          <a:p>
+            <a:pPr lvl="1"/>
+            <a:r>
+              <a:rPr lang="en-IE" dirty="0" smtClean="0"/>
+              <a:t>3D </a:t>
+            </a:r>
+            <a:r>
+              <a:rPr lang="en-IE" dirty="0" smtClean="0"/>
+              <a:t>Game in </a:t>
+            </a:r>
+            <a:r>
+              <a:rPr lang="en-IE" dirty="0" smtClean="0"/>
+              <a:t>unity</a:t>
+            </a:r>
+          </a:p>
+          <a:p>
+            <a:pPr lvl="1"/>
+            <a:r>
+              <a:rPr lang="en-IE" dirty="0" smtClean="0"/>
+              <a:t>Controlling Sphere Game </a:t>
+            </a:r>
+            <a:r>
+              <a:rPr lang="en-IE" dirty="0" smtClean="0"/>
+              <a:t>object with Mobile </a:t>
+            </a:r>
+            <a:r>
+              <a:rPr lang="en-IE" dirty="0" smtClean="0"/>
+              <a:t>Gyroscope/Accelerometer</a:t>
+            </a:r>
+          </a:p>
+          <a:p>
+            <a:pPr lvl="1"/>
+            <a:r>
+              <a:rPr lang="en-IE" dirty="0" smtClean="0"/>
+              <a:t>With </a:t>
+            </a:r>
+            <a:r>
+              <a:rPr lang="en-IE" dirty="0" smtClean="0"/>
+              <a:t>Game objects to avoid and </a:t>
+            </a:r>
+            <a:r>
+              <a:rPr lang="en-IE" dirty="0" smtClean="0"/>
+              <a:t>collect</a:t>
+            </a:r>
+          </a:p>
+          <a:p>
+            <a:pPr lvl="1"/>
+            <a:r>
+              <a:rPr lang="en-IE" dirty="0" smtClean="0"/>
+              <a:t>Hand </a:t>
+            </a:r>
+            <a:r>
+              <a:rPr lang="en-IE" dirty="0" smtClean="0"/>
+              <a:t>or head gestures </a:t>
+            </a:r>
+            <a:r>
+              <a:rPr lang="en-IE" dirty="0" smtClean="0"/>
+              <a:t>to move the sphere</a:t>
+            </a:r>
+            <a:endParaRPr lang="en-IE" dirty="0" smtClean="0"/>
+          </a:p>
+          <a:p>
+            <a:r>
+              <a:rPr lang="en-IE" dirty="0" smtClean="0"/>
+              <a:t>Problems with the Idea </a:t>
             </a:r>
           </a:p>
           <a:p>
@@ -3106,8 +3175,13 @@
             </a:r>
             <a:r>
               <a:rPr lang="en-IE" dirty="0" smtClean="0"/>
-              <a:t>3D Game in unity</a:t>
-            </a:r>
+              <a:t>Phone data not streaming </a:t>
+            </a:r>
+            <a:r>
+              <a:rPr lang="en-IE" dirty="0" smtClean="0"/>
+              <a:t>data correctly</a:t>
+            </a:r>
+            <a:endParaRPr lang="en-IE" dirty="0" smtClean="0"/>
           </a:p>
           <a:p>
             <a:pPr marL="0" indent="0">
@@ -3119,65 +3193,11 @@
             </a:r>
             <a:r>
               <a:rPr lang="en-IE" dirty="0" smtClean="0"/>
-              <a:t>Controlling Game object with Mobile Gyroscope/Accelerometer</a:t>
-            </a:r>
-          </a:p>
-          <a:p>
-            <a:pPr marL="0" indent="0">
-              <a:buNone/>
-            </a:pPr>
-            <a:r>
-              <a:rPr lang="en-IE" dirty="0"/>
-              <a:t>	</a:t>
-            </a:r>
-            <a:r>
-              <a:rPr lang="en-IE" dirty="0" smtClean="0"/>
-              <a:t>With Game objects to avoid and collect</a:t>
-            </a:r>
-          </a:p>
-          <a:p>
-            <a:pPr marL="0" indent="0">
-              <a:buNone/>
-            </a:pPr>
-            <a:r>
-              <a:rPr lang="en-IE" dirty="0"/>
-              <a:t>	</a:t>
-            </a:r>
-            <a:r>
-              <a:rPr lang="en-IE" dirty="0" smtClean="0"/>
-              <a:t>Hand or head gestures were planned to be used</a:t>
-            </a:r>
-          </a:p>
-          <a:p>
-            <a:r>
-              <a:rPr lang="en-IE" dirty="0" smtClean="0"/>
-              <a:t>Problems with the Idea </a:t>
-            </a:r>
-          </a:p>
-          <a:p>
-            <a:pPr marL="0" indent="0">
-              <a:buNone/>
-            </a:pPr>
-            <a:r>
-              <a:rPr lang="en-IE" dirty="0"/>
-              <a:t>	</a:t>
-            </a:r>
-            <a:r>
-              <a:rPr lang="en-IE" dirty="0" smtClean="0"/>
-              <a:t>Phone data not streaming correctly</a:t>
-            </a:r>
-          </a:p>
-          <a:p>
-            <a:pPr marL="0" indent="0">
-              <a:buNone/>
-            </a:pPr>
-            <a:r>
-              <a:rPr lang="en-IE" dirty="0"/>
-              <a:t>	</a:t>
-            </a:r>
-            <a:r>
-              <a:rPr lang="en-IE" dirty="0" smtClean="0"/>
-              <a:t>A known problem with my device.</a:t>
+              <a:t>A known problem with my </a:t>
+            </a:r>
+            <a:r>
+              <a:rPr lang="en-IE" dirty="0" smtClean="0"/>
+              <a:t>device</a:t>
             </a:r>
             <a:endParaRPr lang="en-IE" dirty="0"/>
           </a:p>
@@ -3604,7 +3624,11 @@
           <a:p>
             <a:r>
               <a:rPr lang="en-IE" dirty="0" smtClean="0"/>
-              <a:t>Three elements (Each one an array)</a:t>
+              <a:t>Three </a:t>
+            </a:r>
+            <a:r>
+              <a:rPr lang="en-IE" dirty="0" smtClean="0"/>
+              <a:t>Game element arrays</a:t>
             </a:r>
           </a:p>
           <a:p>
@@ -3618,7 +3642,11 @@
             <a:pPr lvl="1"/>
             <a:r>
               <a:rPr lang="en-IE" dirty="0" smtClean="0"/>
-              <a:t>The deck (pop from the deck array at every turn and start game)</a:t>
+              <a:t>The </a:t>
+            </a:r>
+            <a:r>
+              <a:rPr lang="en-IE" dirty="0" smtClean="0"/>
+              <a:t>deck (pop from the deck array at every turn and start game)</a:t>
             </a:r>
           </a:p>
           <a:p>
@@ -4259,8 +4287,13 @@
             <a:pPr lvl="1"/>
             <a:r>
               <a:rPr lang="en-IE" dirty="0" smtClean="0"/>
-              <a:t>Many people had the same problems I had (with easy fixes)Cons</a:t>
-            </a:r>
+              <a:t>Many people had the same problems I had (with easy </a:t>
+            </a:r>
+            <a:r>
+              <a:rPr lang="en-IE" dirty="0" smtClean="0"/>
+              <a:t>fixes)</a:t>
+            </a:r>
+            <a:endParaRPr lang="en-IE" dirty="0" smtClean="0"/>
           </a:p>
           <a:p>
             <a:pPr marL="0" indent="0">
@@ -4282,8 +4315,24 @@
               <a:t>apk</a:t>
             </a:r>
             <a:r>
-              <a:rPr lang="en-IE" dirty="0" smtClean="0"/>
-              <a:t> and Google VR with unity </a:t>
+              <a:rPr lang="en-IE" dirty="0"/>
+              <a:t>,</a:t>
+            </a:r>
+            <a:r>
+              <a:rPr lang="en-IE" dirty="0" smtClean="0"/>
+              <a:t> </a:t>
+            </a:r>
+            <a:r>
+              <a:rPr lang="en-IE" dirty="0" smtClean="0"/>
+              <a:t>Google VR </a:t>
+            </a:r>
+            <a:r>
+              <a:rPr lang="en-IE" dirty="0" smtClean="0"/>
+              <a:t>and </a:t>
+            </a:r>
+            <a:r>
+              <a:rPr lang="en-IE" dirty="0" smtClean="0"/>
+              <a:t>unity </a:t>
             </a:r>
           </a:p>
           <a:p>
@@ -4315,16 +4364,16 @@
               <a:t>Unity </a:t>
             </a:r>
             <a:r>
+              <a:rPr lang="en-IE"/>
+              <a:t>view </a:t>
+            </a:r>
+            <a:r>
+              <a:rPr lang="en-IE" smtClean="0"/>
+              <a:t>different phone </a:t>
+            </a:r>
+            <a:r>
               <a:rPr lang="en-IE" dirty="0"/>
-              <a:t>view is not the same </a:t>
-            </a:r>
-            <a:r>
-              <a:rPr lang="en-IE" dirty="0" smtClean="0"/>
-              <a:t>as </a:t>
-            </a:r>
-            <a:r>
-              <a:rPr lang="en-IE" dirty="0"/>
-              <a:t>phone build view</a:t>
+              <a:t>build view</a:t>
             </a:r>
           </a:p>
           <a:p>

</xml_diff>